<commit_message>
update overview & webdev pptx
</commit_message>
<xml_diff>
--- a/1-Overview-Tools-Acquisition/netcore-workshop-overview-tools.pptx
+++ b/1-Overview-Tools-Acquisition/netcore-workshop-overview-tools.pptx
@@ -232,10 +232,6 @@
 </p:cmAuthorLst>
 </file>
 
-<file path=ppt/revisionInfo.xml><?xml version="1.0" encoding="utf-8"?>
-<p1510:revInfo xmlns:a="http://schemas.openxmlformats.org/drawingml/2006/main" xmlns:r="http://schemas.openxmlformats.org/officeDocument/2006/relationships" xmlns:p1510="http://schemas.microsoft.com/office/powerpoint/2015/10/main"/>
-</file>
-
 <file path=ppt/handoutMasters/handoutMaster1.xml><?xml version="1.0" encoding="utf-8"?>
 <p:handoutMaster xmlns:a="http://schemas.openxmlformats.org/drawingml/2006/main" xmlns:r="http://schemas.openxmlformats.org/officeDocument/2006/relationships" xmlns:p="http://schemas.openxmlformats.org/presentationml/2006/main">
   <p:cSld>
@@ -325,7 +321,7 @@
               <a:rPr lang="en-US" smtClean="0">
                 <a:latin typeface="Segoe UI" pitchFamily="34" charset="0"/>
               </a:rPr>
-              <a:t>9/23/2017 8:31 AM</a:t>
+              <a:t>7/3/18 11:17 AM</a:t>
             </a:fld>
             <a:endParaRPr lang="en-US" dirty="0">
               <a:latin typeface="Segoe UI" pitchFamily="34" charset="0"/>
@@ -606,7 +602,7 @@
           <a:p>
             <a:fld id="{38EEC551-8CDA-4EB6-89BB-2A86C9F091C8}" type="datetime8">
               <a:rPr lang="en-US" smtClean="0"/>
-              <a:t>9/23/2017 8:18 AM</a:t>
+              <a:t>7/3/18 11:17 AM</a:t>
             </a:fld>
             <a:endParaRPr lang="en-US" dirty="0"/>
           </a:p>
@@ -1023,7 +1019,7 @@
           <a:p>
             <a:fld id="{38EEC551-8CDA-4EB6-89BB-2A86C9F091C8}" type="datetime8">
               <a:rPr lang="en-US" smtClean="0"/>
-              <a:t>9/23/2017 8:18 AM</a:t>
+              <a:t>7/3/18 11:17 AM</a:t>
             </a:fld>
             <a:endParaRPr lang="en-US" dirty="0"/>
           </a:p>
@@ -1332,7 +1328,7 @@
           <a:p>
             <a:fld id="{7D10C09F-FCA1-48C8-B40D-42E1045D109E}" type="datetime8">
               <a:rPr lang="en-US" smtClean="0"/>
-              <a:t>9/23/2017 8:18 AM</a:t>
+              <a:t>7/3/18 11:17 AM</a:t>
             </a:fld>
             <a:endParaRPr lang="en-US" dirty="0"/>
           </a:p>
@@ -1517,7 +1513,7 @@
           <a:p>
             <a:fld id="{38EEC551-8CDA-4EB6-89BB-2A86C9F091C8}" type="datetime8">
               <a:rPr lang="en-US" smtClean="0"/>
-              <a:t>9/23/2017 8:18 AM</a:t>
+              <a:t>7/3/18 11:17 AM</a:t>
             </a:fld>
             <a:endParaRPr lang="en-US" dirty="0"/>
           </a:p>
@@ -1702,7 +1698,7 @@
           <a:p>
             <a:fld id="{38EEC551-8CDA-4EB6-89BB-2A86C9F091C8}" type="datetime8">
               <a:rPr lang="en-US" smtClean="0"/>
-              <a:t>9/23/2017 8:18 AM</a:t>
+              <a:t>7/3/18 11:17 AM</a:t>
             </a:fld>
             <a:endParaRPr lang="en-US" dirty="0"/>
           </a:p>
@@ -1890,7 +1886,7 @@
           <a:p>
             <a:fld id="{38EEC551-8CDA-4EB6-89BB-2A86C9F091C8}" type="datetime8">
               <a:rPr lang="en-US" smtClean="0"/>
-              <a:t>9/23/2017 8:18 AM</a:t>
+              <a:t>7/3/18 11:17 AM</a:t>
             </a:fld>
             <a:endParaRPr lang="en-US" dirty="0"/>
           </a:p>
@@ -2202,7 +2198,7 @@
           <a:p>
             <a:fld id="{38EEC551-8CDA-4EB6-89BB-2A86C9F091C8}" type="datetime8">
               <a:rPr lang="en-US" smtClean="0"/>
-              <a:t>9/23/2017 8:18 AM</a:t>
+              <a:t>7/3/18 11:17 AM</a:t>
             </a:fld>
             <a:endParaRPr lang="en-US" dirty="0"/>
           </a:p>
@@ -2466,7 +2462,7 @@
                 <a:tabLst/>
                 <a:defRPr/>
               </a:pPr>
-              <a:t>9/23/2017 8:18 AM</a:t>
+              <a:t>7/3/18 11:30 AM</a:t>
             </a:fld>
             <a:endParaRPr kumimoji="0" lang="en-US" sz="1200" b="0" i="0" u="none" strike="noStrike" kern="1200" cap="none" spc="0" normalizeH="0" baseline="0" noProof="0" dirty="0">
               <a:ln>
@@ -2723,7 +2719,7 @@
           <a:p>
             <a:fld id="{38EEC551-8CDA-4EB6-89BB-2A86C9F091C8}" type="datetime8">
               <a:rPr lang="en-US" smtClean="0"/>
-              <a:t>9/23/2017 8:18 AM</a:t>
+              <a:t>7/3/18 11:17 AM</a:t>
             </a:fld>
             <a:endParaRPr lang="en-US" dirty="0"/>
           </a:p>
@@ -2908,7 +2904,7 @@
           <a:p>
             <a:fld id="{38EEC551-8CDA-4EB6-89BB-2A86C9F091C8}" type="datetime8">
               <a:rPr lang="en-US" smtClean="0"/>
-              <a:t>9/23/2017 8:18 AM</a:t>
+              <a:t>7/3/18 11:17 AM</a:t>
             </a:fld>
             <a:endParaRPr lang="en-US" dirty="0"/>
           </a:p>
@@ -3157,7 +3153,7 @@
           <a:p>
             <a:fld id="{7D10C09F-FCA1-48C8-B40D-42E1045D109E}" type="datetime8">
               <a:rPr lang="en-US" smtClean="0"/>
-              <a:t>9/23/2017 8:18 AM</a:t>
+              <a:t>7/3/18 11:17 AM</a:t>
             </a:fld>
             <a:endParaRPr lang="en-US" dirty="0"/>
           </a:p>
@@ -3409,7 +3405,7 @@
           <a:p>
             <a:fld id="{7D10C09F-FCA1-48C8-B40D-42E1045D109E}" type="datetime8">
               <a:rPr lang="en-US" smtClean="0"/>
-              <a:t>9/23/2017 8:18 AM</a:t>
+              <a:t>7/3/18 11:17 AM</a:t>
             </a:fld>
             <a:endParaRPr lang="en-US" dirty="0"/>
           </a:p>
@@ -3541,7 +3537,7 @@
           <a:p>
             <a:fld id="{6108602D-D426-4C00-B215-BFA18C076426}" type="datetime8">
               <a:rPr lang="en-US" smtClean="0"/>
-              <a:t>9/23/2017 8:18 AM</a:t>
+              <a:t>7/3/18 11:17 AM</a:t>
             </a:fld>
             <a:endParaRPr lang="en-US" dirty="0"/>
           </a:p>
@@ -3754,7 +3750,7 @@
           <a:p>
             <a:fld id="{6108602D-D426-4C00-B215-BFA18C076426}" type="datetime8">
               <a:rPr lang="en-US" smtClean="0"/>
-              <a:t>9/23/2017 8:18 AM</a:t>
+              <a:t>7/3/18 11:17 AM</a:t>
             </a:fld>
             <a:endParaRPr lang="en-US" dirty="0"/>
           </a:p>
@@ -3996,7 +3992,7 @@
           <a:p>
             <a:fld id="{6108602D-D426-4C00-B215-BFA18C076426}" type="datetime8">
               <a:rPr lang="en-US" smtClean="0"/>
-              <a:t>9/23/2017 8:18 AM</a:t>
+              <a:t>7/3/18 11:17 AM</a:t>
             </a:fld>
             <a:endParaRPr lang="en-US" dirty="0"/>
           </a:p>
@@ -4194,7 +4190,7 @@
           <a:p>
             <a:fld id="{7D10C09F-FCA1-48C8-B40D-42E1045D109E}" type="datetime8">
               <a:rPr lang="en-US" smtClean="0"/>
-              <a:t>9/23/2017 8:18 AM</a:t>
+              <a:t>7/3/18 11:17 AM</a:t>
             </a:fld>
             <a:endParaRPr lang="en-US" dirty="0"/>
           </a:p>
@@ -4379,7 +4375,7 @@
           <a:p>
             <a:fld id="{38EEC551-8CDA-4EB6-89BB-2A86C9F091C8}" type="datetime8">
               <a:rPr lang="en-US" smtClean="0"/>
-              <a:t>9/23/2017 8:18 AM</a:t>
+              <a:t>7/3/18 11:17 AM</a:t>
             </a:fld>
             <a:endParaRPr lang="en-US" dirty="0"/>
           </a:p>
@@ -4614,7 +4610,7 @@
           <a:p>
             <a:fld id="{38EEC551-8CDA-4EB6-89BB-2A86C9F091C8}" type="datetime8">
               <a:rPr lang="en-US" smtClean="0"/>
-              <a:t>9/23/2017 8:18 AM</a:t>
+              <a:t>7/3/18 11:17 AM</a:t>
             </a:fld>
             <a:endParaRPr lang="en-US" dirty="0"/>
           </a:p>
@@ -4799,7 +4795,7 @@
           <a:p>
             <a:fld id="{38EEC551-8CDA-4EB6-89BB-2A86C9F091C8}" type="datetime8">
               <a:rPr lang="en-US" smtClean="0"/>
-              <a:t>9/23/2017 8:18 AM</a:t>
+              <a:t>7/3/18 11:17 AM</a:t>
             </a:fld>
             <a:endParaRPr lang="en-US" dirty="0"/>
           </a:p>
@@ -4961,7 +4957,7 @@
           <a:p>
             <a:fld id="{E74353ED-ACB2-44BF-A903-985B0AF962B7}" type="datetime1">
               <a:rPr lang="en-US" smtClean="0"/>
-              <a:t>9/23/2017</a:t>
+              <a:t>7/3/18</a:t>
             </a:fld>
             <a:endParaRPr lang="en-US" dirty="0"/>
           </a:p>
@@ -5225,7 +5221,7 @@
                 <a:tabLst/>
                 <a:defRPr/>
               </a:pPr>
-              <a:t>9/23/2017 8:18 AM</a:t>
+              <a:t>7/3/18 11:17 AM</a:t>
             </a:fld>
             <a:endParaRPr kumimoji="0" lang="en-US" sz="1200" b="0" i="0" u="none" strike="noStrike" kern="1200" cap="none" spc="0" normalizeH="0" baseline="0" noProof="0" dirty="0">
               <a:ln>
@@ -5429,7 +5425,7 @@
           <a:p>
             <a:fld id="{6108602D-D426-4C00-B215-BFA18C076426}" type="datetime8">
               <a:rPr lang="en-US" smtClean="0"/>
-              <a:t>9/23/2017 8:18 AM</a:t>
+              <a:t>7/3/18 11:17 AM</a:t>
             </a:fld>
             <a:endParaRPr lang="en-US" dirty="0"/>
           </a:p>
@@ -5594,7 +5590,7 @@
           <a:p>
             <a:fld id="{6108602D-D426-4C00-B215-BFA18C076426}" type="datetime8">
               <a:rPr lang="en-US" smtClean="0"/>
-              <a:t>9/23/2017 8:18 AM</a:t>
+              <a:t>7/3/18 11:17 AM</a:t>
             </a:fld>
             <a:endParaRPr lang="en-US" dirty="0"/>
           </a:p>
@@ -5930,7 +5926,7 @@
                 <a:tabLst/>
                 <a:defRPr/>
               </a:pPr>
-              <a:t>9/23/2017 8:18 AM</a:t>
+              <a:t>7/3/18 11:17 AM</a:t>
             </a:fld>
             <a:endParaRPr kumimoji="0" lang="en-US" sz="1200" b="0" i="0" u="none" strike="noStrike" kern="1200" cap="none" spc="0" normalizeH="0" baseline="0" noProof="0" dirty="0">
               <a:ln>
@@ -6167,7 +6163,7 @@
           <a:p>
             <a:fld id="{7D10C09F-FCA1-48C8-B40D-42E1045D109E}" type="datetime8">
               <a:rPr lang="en-US" smtClean="0"/>
-              <a:t>9/23/2017 8:18 AM</a:t>
+              <a:t>7/3/18 11:17 AM</a:t>
             </a:fld>
             <a:endParaRPr lang="en-US" dirty="0"/>
           </a:p>
@@ -6445,7 +6441,7 @@
           <a:p>
             <a:fld id="{38EEC551-8CDA-4EB6-89BB-2A86C9F091C8}" type="datetime8">
               <a:rPr lang="en-US" smtClean="0"/>
-              <a:t>9/23/2017 8:18 AM</a:t>
+              <a:t>7/3/18 11:17 AM</a:t>
             </a:fld>
             <a:endParaRPr lang="en-US" dirty="0"/>
           </a:p>
@@ -6723,7 +6719,7 @@
           <a:p>
             <a:fld id="{38EEC551-8CDA-4EB6-89BB-2A86C9F091C8}" type="datetime8">
               <a:rPr lang="en-US" smtClean="0"/>
-              <a:t>9/23/2017 8:18 AM</a:t>
+              <a:t>7/3/18 11:17 AM</a:t>
             </a:fld>
             <a:endParaRPr lang="en-US" dirty="0"/>
           </a:p>
@@ -7001,7 +6997,7 @@
           <a:p>
             <a:fld id="{38EEC551-8CDA-4EB6-89BB-2A86C9F091C8}" type="datetime8">
               <a:rPr lang="en-US" smtClean="0"/>
-              <a:t>9/23/2017 8:18 AM</a:t>
+              <a:t>7/3/18 11:17 AM</a:t>
             </a:fld>
             <a:endParaRPr lang="en-US" dirty="0"/>
           </a:p>
@@ -7279,7 +7275,7 @@
           <a:p>
             <a:fld id="{38EEC551-8CDA-4EB6-89BB-2A86C9F091C8}" type="datetime8">
               <a:rPr lang="en-US" smtClean="0"/>
-              <a:t>9/23/2017 8:18 AM</a:t>
+              <a:t>7/3/18 11:17 AM</a:t>
             </a:fld>
             <a:endParaRPr lang="en-US" dirty="0"/>
           </a:p>
@@ -7557,7 +7553,7 @@
           <a:p>
             <a:fld id="{38EEC551-8CDA-4EB6-89BB-2A86C9F091C8}" type="datetime8">
               <a:rPr lang="en-US" smtClean="0"/>
-              <a:t>9/23/2017 8:18 AM</a:t>
+              <a:t>7/3/18 11:17 AM</a:t>
             </a:fld>
             <a:endParaRPr lang="en-US" dirty="0"/>
           </a:p>
@@ -7860,7 +7856,7 @@
                 <a:tabLst/>
                 <a:defRPr/>
               </a:pPr>
-              <a:t>9/23/2017 8:18 AM</a:t>
+              <a:t>7/3/18 11:17 AM</a:t>
             </a:fld>
             <a:endParaRPr kumimoji="0" lang="en-US" sz="1200" b="0" i="0" u="none" strike="noStrike" kern="1200" cap="none" spc="0" normalizeH="0" baseline="0" noProof="0" dirty="0">
               <a:ln>
@@ -8196,7 +8192,7 @@
                 <a:tabLst/>
                 <a:defRPr/>
               </a:pPr>
-              <a:t>9/23/2017 8:18 AM</a:t>
+              <a:t>7/3/18 11:17 AM</a:t>
             </a:fld>
             <a:endParaRPr kumimoji="0" lang="en-US" sz="1200" b="0" i="0" u="none" strike="noStrike" kern="1200" cap="none" spc="0" normalizeH="0" baseline="0" noProof="0" dirty="0">
               <a:ln>
@@ -8532,7 +8528,7 @@
                 <a:tabLst/>
                 <a:defRPr/>
               </a:pPr>
-              <a:t>9/23/2017 8:18 AM</a:t>
+              <a:t>7/3/18 11:17 AM</a:t>
             </a:fld>
             <a:endParaRPr kumimoji="0" lang="en-US" sz="1200" b="0" i="0" u="none" strike="noStrike" kern="1200" cap="none" spc="0" normalizeH="0" baseline="0" noProof="0" dirty="0">
               <a:ln>
@@ -8789,7 +8785,7 @@
           <a:p>
             <a:fld id="{38EEC551-8CDA-4EB6-89BB-2A86C9F091C8}" type="datetime8">
               <a:rPr lang="en-US" smtClean="0"/>
-              <a:t>9/23/2017 8:18 AM</a:t>
+              <a:t>7/3/18 11:17 AM</a:t>
             </a:fld>
             <a:endParaRPr lang="en-US" dirty="0"/>
           </a:p>
@@ -8974,7 +8970,7 @@
           <a:p>
             <a:fld id="{38EEC551-8CDA-4EB6-89BB-2A86C9F091C8}" type="datetime8">
               <a:rPr lang="en-US" smtClean="0"/>
-              <a:t>9/23/2017 8:18 AM</a:t>
+              <a:t>7/3/18 11:17 AM</a:t>
             </a:fld>
             <a:endParaRPr lang="en-US" dirty="0"/>
           </a:p>
@@ -9159,7 +9155,7 @@
           <a:p>
             <a:fld id="{38EEC551-8CDA-4EB6-89BB-2A86C9F091C8}" type="datetime8">
               <a:rPr lang="en-US" smtClean="0"/>
-              <a:t>9/23/2017 8:18 AM</a:t>
+              <a:t>7/3/18 11:17 AM</a:t>
             </a:fld>
             <a:endParaRPr lang="en-US" dirty="0"/>
           </a:p>
@@ -9344,7 +9340,7 @@
           <a:p>
             <a:fld id="{38EEC551-8CDA-4EB6-89BB-2A86C9F091C8}" type="datetime8">
               <a:rPr lang="en-US" smtClean="0"/>
-              <a:t>9/23/2017 8:18 AM</a:t>
+              <a:t>7/3/18 11:17 AM</a:t>
             </a:fld>
             <a:endParaRPr lang="en-US" dirty="0"/>
           </a:p>
@@ -30098,7 +30094,7 @@
             </a:r>
             <a:r>
               <a:rPr lang="en-US" dirty="0"/>
-              <a:t> (10.12)</a:t>
+              <a:t> (10.12+)</a:t>
             </a:r>
           </a:p>
           <a:p>
@@ -30127,7 +30123,7 @@
         <p:spPr>
           <a:xfrm>
             <a:off x="6675439" y="1212849"/>
-            <a:ext cx="5486399" cy="4690515"/>
+            <a:ext cx="5486399" cy="5096780"/>
           </a:xfrm>
         </p:spPr>
         <p:txBody>
@@ -30147,7 +30143,7 @@
             </a:r>
             <a:r>
               <a:rPr lang="en-US" dirty="0"/>
-              <a:t>7</a:t>
+              <a:t>6,7</a:t>
             </a:r>
           </a:p>
           <a:p>
@@ -30158,7 +30154,7 @@
             </a:r>
             <a:r>
               <a:rPr lang="en-US" dirty="0"/>
-              <a:t>25, 26</a:t>
+              <a:t>27,28</a:t>
             </a:r>
           </a:p>
           <a:p>
@@ -30180,7 +30176,7 @@
             </a:r>
             <a:r>
               <a:rPr lang="en-US" dirty="0"/>
-              <a:t>8.7+</a:t>
+              <a:t>9,8.7+</a:t>
             </a:r>
           </a:p>
           <a:p>
@@ -30191,7 +30187,7 @@
             </a:r>
             <a:r>
               <a:rPr lang="en-US" dirty="0"/>
-              <a:t>14.04, 16.04, 17.04</a:t>
+              <a:t>18.04, 17.10, 16.04, 14.04</a:t>
             </a:r>
           </a:p>
           <a:p>
@@ -30213,7 +30209,7 @@
             </a:r>
             <a:r>
               <a:rPr lang="en-US" dirty="0"/>
-              <a:t> 42.2+</a:t>
+              <a:t> 42.3+</a:t>
             </a:r>
           </a:p>
           <a:p>
@@ -30236,6 +30232,17 @@
             <a:r>
               <a:rPr lang="en-US" dirty="0"/>
               <a:t>12 SP2+</a:t>
+            </a:r>
+          </a:p>
+          <a:p>
+            <a:pPr lvl="1"/>
+            <a:r>
+              <a:rPr lang="en-US" b="1" dirty="0"/>
+              <a:t>Alpine Linux</a:t>
+            </a:r>
+            <a:r>
+              <a:rPr lang="en-US" dirty="0"/>
+              <a:t> 3.7+</a:t>
             </a:r>
           </a:p>
           <a:p>
@@ -30273,7 +30280,15 @@
           <a:p>
             <a:r>
               <a:rPr lang="en-US" dirty="0"/>
-              <a:t>https://github.com/dotnet/core/blob/master/release-notes/2.0/2.0-supported-os.md</a:t>
+              <a:t>https://</a:t>
+            </a:r>
+            <a:r>
+              <a:rPr lang="en-US" dirty="0" err="1"/>
+              <a:t>github.com</a:t>
+            </a:r>
+            <a:r>
+              <a:rPr lang="en-US" dirty="0"/>
+              <a:t>/dotnet/core/blob/master/release-notes/2.1/2.1-supported-os.md</a:t>
             </a:r>
           </a:p>
         </p:txBody>
@@ -31482,7 +31497,7 @@
                   <a:srgbClr val="00B050"/>
                 </a:solidFill>
               </a:rPr>
-              <a:t>netcoreapp2.0</a:t>
+              <a:t>netcoreapp2.1</a:t>
             </a:r>
             <a:r>
               <a:rPr lang="en-US" dirty="0"/>
@@ -31603,7 +31618,7 @@
         <p:spPr>
           <a:xfrm>
             <a:off x="274638" y="1221157"/>
-            <a:ext cx="12527207" cy="5769272"/>
+            <a:ext cx="12527207" cy="5312223"/>
           </a:xfrm>
         </p:spPr>
         <p:txBody>
@@ -31668,7 +31683,7 @@
                   <a:srgbClr val="00B050"/>
                 </a:solidFill>
               </a:rPr>
-              <a:t>netcoreapp2.0</a:t>
+              <a:t>netcoreapp2.1</a:t>
             </a:r>
             <a:r>
               <a:rPr lang="en-US" sz="2800" dirty="0"/>
@@ -31772,11 +31787,11 @@
                   <a:srgbClr val="00B050"/>
                 </a:solidFill>
               </a:rPr>
-              <a:t>Microsoft.AspNetCore.All</a:t>
+              <a:t>Microsoft.AspNetCore.App</a:t>
             </a:r>
             <a:r>
               <a:rPr lang="en-US" sz="2800" dirty="0"/>
-              <a:t>" 	Version="2.0.0" /&gt;</a:t>
+              <a:t>" /&gt;</a:t>
             </a:r>
           </a:p>
           <a:p>
@@ -40786,7 +40801,7 @@
             </a:r>
             <a:r>
               <a:rPr lang="en-US" sz="2400" dirty="0"/>
-              <a:t> Framework Benchmarks – Round 14 </a:t>
+              <a:t> Framework Benchmarks – Round 16 </a:t>
             </a:r>
             <a:r>
               <a:rPr lang="mr-IN" sz="2400" dirty="0"/>
@@ -40821,10 +40836,10 @@
       </p:sp>
       <p:pic>
         <p:nvPicPr>
-          <p:cNvPr id="6" name="Picture 5" descr="A screenshot of a computer&#10;&#10;Description generated with high confidence">
+          <p:cNvPr id="4" name="Picture 3">
             <a:extLst>
               <a:ext uri="{FF2B5EF4-FFF2-40B4-BE49-F238E27FC236}">
-                <a16:creationId xmlns:a16="http://schemas.microsoft.com/office/drawing/2014/main" id="{E7B77187-D59D-4960-A700-014EC29E45DD}"/>
+                <a16:creationId xmlns:a16="http://schemas.microsoft.com/office/drawing/2014/main" id="{15FAF517-AF3F-664D-A015-E77DBB8CB774}"/>
               </a:ext>
             </a:extLst>
           </p:cNvPr>
@@ -40841,8 +40856,8 @@
         </p:blipFill>
         <p:spPr>
           <a:xfrm>
-            <a:off x="0" y="1394165"/>
-            <a:ext cx="12436475" cy="4866060"/>
+            <a:off x="11192" y="1668482"/>
+            <a:ext cx="12424897" cy="3959436"/>
           </a:xfrm>
           <a:prstGeom prst="rect">
             <a:avLst/>
@@ -42481,21 +42496,12 @@
 </file>
 
 <file path=customXml/item1.xml><?xml version="1.0" encoding="utf-8"?>
-<?mso-contentType ?>
-<FormTemplates xmlns="http://schemas.microsoft.com/sharepoint/v3/contenttype/forms">
-  <Display>DocumentLibraryForm</Display>
-  <Edit>DocumentLibraryForm</Edit>
-  <New>DocumentLibraryForm</New>
-</FormTemplates>
-</file>
-
-<file path=customXml/item2.xml><?xml version="1.0" encoding="utf-8"?>
 <p:properties xmlns:p="http://schemas.microsoft.com/office/2006/metadata/properties" xmlns:xsi="http://www.w3.org/2001/XMLSchema-instance" xmlns:pc="http://schemas.microsoft.com/office/infopath/2007/PartnerControls">
   <documentManagement/>
 </p:properties>
 </file>
 
-<file path=customXml/item3.xml><?xml version="1.0" encoding="utf-8"?>
+<file path=customXml/item2.xml><?xml version="1.0" encoding="utf-8"?>
 <ct:contentTypeSchema xmlns:ct="http://schemas.microsoft.com/office/2006/metadata/contentType" xmlns:ma="http://schemas.microsoft.com/office/2006/metadata/properties/metaAttributes" ct:_="" ma:_="" ma:contentTypeName="Document" ma:contentTypeID="0x0101004C8AF336095DB84A94AB1A4B939C0475" ma:contentTypeVersion="4" ma:contentTypeDescription="Create a new document." ma:contentTypeScope="" ma:versionID="6f8327450122d2e4aedd139501eaa58b">
   <xsd:schema xmlns:xsd="http://www.w3.org/2001/XMLSchema" xmlns:xs="http://www.w3.org/2001/XMLSchema" xmlns:p="http://schemas.microsoft.com/office/2006/metadata/properties" xmlns:ns2="29eeffc7-3a1a-4f16-995c-1b7b58342919" targetNamespace="http://schemas.microsoft.com/office/2006/metadata/properties" ma:root="true" ma:fieldsID="7d6c3be25c216b690a82d24b3f2244b5" ns2:_="">
     <xsd:import namespace="29eeffc7-3a1a-4f16-995c-1b7b58342919"/>
@@ -42657,15 +42663,16 @@
 </ct:contentTypeSchema>
 </file>
 
-<file path=customXml/itemProps1.xml><?xml version="1.0" encoding="utf-8"?>
-<ds:datastoreItem xmlns:ds="http://schemas.openxmlformats.org/officeDocument/2006/customXml" ds:itemID="{758FDAC0-319D-4A54-8D8E-1D42CB1F8004}">
-  <ds:schemaRefs>
-    <ds:schemaRef ds:uri="http://schemas.microsoft.com/sharepoint/v3/contenttype/forms"/>
-  </ds:schemaRefs>
-</ds:datastoreItem>
+<file path=customXml/item3.xml><?xml version="1.0" encoding="utf-8"?>
+<?mso-contentType ?>
+<FormTemplates xmlns="http://schemas.microsoft.com/sharepoint/v3/contenttype/forms">
+  <Display>DocumentLibraryForm</Display>
+  <Edit>DocumentLibraryForm</Edit>
+  <New>DocumentLibraryForm</New>
+</FormTemplates>
 </file>
 
-<file path=customXml/itemProps2.xml><?xml version="1.0" encoding="utf-8"?>
+<file path=customXml/itemProps1.xml><?xml version="1.0" encoding="utf-8"?>
 <ds:datastoreItem xmlns:ds="http://schemas.openxmlformats.org/officeDocument/2006/customXml" ds:itemID="{F990F116-B58F-4255-B05B-DA3808E0E5C6}">
   <ds:schemaRefs>
     <ds:schemaRef ds:uri="http://schemas.microsoft.com/office/2006/metadata/properties"/>
@@ -42681,7 +42688,7 @@
 </ds:datastoreItem>
 </file>
 
-<file path=customXml/itemProps3.xml><?xml version="1.0" encoding="utf-8"?>
+<file path=customXml/itemProps2.xml><?xml version="1.0" encoding="utf-8"?>
 <ds:datastoreItem xmlns:ds="http://schemas.openxmlformats.org/officeDocument/2006/customXml" ds:itemID="{4C47C6CA-B255-4F53-A8A9-1A4E6D0653D8}">
   <ds:schemaRefs>
     <ds:schemaRef ds:uri="http://schemas.microsoft.com/office/2006/metadata/contentType"/>
@@ -42697,4 +42704,12 @@
     <ds:schemaRef ds:uri="http://schemas.microsoft.com/internal/obd"/>
   </ds:schemaRefs>
 </ds:datastoreItem>
+</file>
+
+<file path=customXml/itemProps3.xml><?xml version="1.0" encoding="utf-8"?>
+<ds:datastoreItem xmlns:ds="http://schemas.openxmlformats.org/officeDocument/2006/customXml" ds:itemID="{758FDAC0-319D-4A54-8D8E-1D42CB1F8004}">
+  <ds:schemaRefs>
+    <ds:schemaRef ds:uri="http://schemas.microsoft.com/sharepoint/v3/contenttype/forms"/>
+  </ds:schemaRefs>
+</ds:datastoreItem>
 </file>
</xml_diff>